<commit_message>
Final version of code
</commit_message>
<xml_diff>
--- a/Final Presentation.pptx
+++ b/Final Presentation.pptx
@@ -625,6 +625,38 @@
     </pc:docChg>
   </pc:docChgLst>
   <pc:docChgLst>
+    <pc:chgData name="Sam Wagner" userId="S::samanthawagner@unomaha.edu::16297234-fb1c-49cd-ab2e-a70cbd0c939b" providerId="AD" clId="Web-{4D929B99-296D-4D51-BFC8-D1D89556A194}"/>
+    <pc:docChg chg="addSld modSld">
+      <pc:chgData name="Sam Wagner" userId="S::samanthawagner@unomaha.edu::16297234-fb1c-49cd-ab2e-a70cbd0c939b" providerId="AD" clId="Web-{4D929B99-296D-4D51-BFC8-D1D89556A194}" dt="2021-12-11T19:36:17.978" v="26" actId="20577"/>
+      <pc:docMkLst>
+        <pc:docMk/>
+      </pc:docMkLst>
+      <pc:sldChg chg="modSp new">
+        <pc:chgData name="Sam Wagner" userId="S::samanthawagner@unomaha.edu::16297234-fb1c-49cd-ab2e-a70cbd0c939b" providerId="AD" clId="Web-{4D929B99-296D-4D51-BFC8-D1D89556A194}" dt="2021-12-11T19:36:17.978" v="26" actId="20577"/>
+        <pc:sldMkLst>
+          <pc:docMk/>
+          <pc:sldMk cId="3736161039" sldId="298"/>
+        </pc:sldMkLst>
+        <pc:spChg chg="mod">
+          <ac:chgData name="Sam Wagner" userId="S::samanthawagner@unomaha.edu::16297234-fb1c-49cd-ab2e-a70cbd0c939b" providerId="AD" clId="Web-{4D929B99-296D-4D51-BFC8-D1D89556A194}" dt="2021-12-11T19:35:33.665" v="11" actId="20577"/>
+          <ac:spMkLst>
+            <pc:docMk/>
+            <pc:sldMk cId="3736161039" sldId="298"/>
+            <ac:spMk id="2" creationId="{34AD8C59-1B8E-4057-A05F-9BE6C0409D34}"/>
+          </ac:spMkLst>
+        </pc:spChg>
+        <pc:spChg chg="mod">
+          <ac:chgData name="Sam Wagner" userId="S::samanthawagner@unomaha.edu::16297234-fb1c-49cd-ab2e-a70cbd0c939b" providerId="AD" clId="Web-{4D929B99-296D-4D51-BFC8-D1D89556A194}" dt="2021-12-11T19:36:17.978" v="26" actId="20577"/>
+          <ac:spMkLst>
+            <pc:docMk/>
+            <pc:sldMk cId="3736161039" sldId="298"/>
+            <ac:spMk id="3" creationId="{785AE07D-EFFC-4FFB-A9B6-15773EDE24BA}"/>
+          </ac:spMkLst>
+        </pc:spChg>
+      </pc:sldChg>
+    </pc:docChg>
+  </pc:docChgLst>
+  <pc:docChgLst>
     <pc:chgData name="Sam Wagner" userId="S::samanthawagner@unomaha.edu::16297234-fb1c-49cd-ab2e-a70cbd0c939b" providerId="AD" clId="Web-{410CFA30-AE29-49EB-BED3-B4C68E227B2F}"/>
     <pc:docChg chg="modSld">
       <pc:chgData name="Sam Wagner" userId="S::samanthawagner@unomaha.edu::16297234-fb1c-49cd-ab2e-a70cbd0c939b" providerId="AD" clId="Web-{410CFA30-AE29-49EB-BED3-B4C68E227B2F}" dt="2021-12-11T16:59:52.483" v="162"/>
@@ -709,38 +741,6 @@
             <ac:cxnSpMk id="11" creationId="{F15CCCF0-E573-463A-9760-1FDC0B2CFBD7}"/>
           </ac:cxnSpMkLst>
         </pc:cxnChg>
-      </pc:sldChg>
-    </pc:docChg>
-  </pc:docChgLst>
-  <pc:docChgLst>
-    <pc:chgData name="Sam Wagner" userId="S::samanthawagner@unomaha.edu::16297234-fb1c-49cd-ab2e-a70cbd0c939b" providerId="AD" clId="Web-{4D929B99-296D-4D51-BFC8-D1D89556A194}"/>
-    <pc:docChg chg="addSld modSld">
-      <pc:chgData name="Sam Wagner" userId="S::samanthawagner@unomaha.edu::16297234-fb1c-49cd-ab2e-a70cbd0c939b" providerId="AD" clId="Web-{4D929B99-296D-4D51-BFC8-D1D89556A194}" dt="2021-12-11T19:36:17.978" v="26" actId="20577"/>
-      <pc:docMkLst>
-        <pc:docMk/>
-      </pc:docMkLst>
-      <pc:sldChg chg="modSp new">
-        <pc:chgData name="Sam Wagner" userId="S::samanthawagner@unomaha.edu::16297234-fb1c-49cd-ab2e-a70cbd0c939b" providerId="AD" clId="Web-{4D929B99-296D-4D51-BFC8-D1D89556A194}" dt="2021-12-11T19:36:17.978" v="26" actId="20577"/>
-        <pc:sldMkLst>
-          <pc:docMk/>
-          <pc:sldMk cId="3736161039" sldId="298"/>
-        </pc:sldMkLst>
-        <pc:spChg chg="mod">
-          <ac:chgData name="Sam Wagner" userId="S::samanthawagner@unomaha.edu::16297234-fb1c-49cd-ab2e-a70cbd0c939b" providerId="AD" clId="Web-{4D929B99-296D-4D51-BFC8-D1D89556A194}" dt="2021-12-11T19:35:33.665" v="11" actId="20577"/>
-          <ac:spMkLst>
-            <pc:docMk/>
-            <pc:sldMk cId="3736161039" sldId="298"/>
-            <ac:spMk id="2" creationId="{34AD8C59-1B8E-4057-A05F-9BE6C0409D34}"/>
-          </ac:spMkLst>
-        </pc:spChg>
-        <pc:spChg chg="mod">
-          <ac:chgData name="Sam Wagner" userId="S::samanthawagner@unomaha.edu::16297234-fb1c-49cd-ab2e-a70cbd0c939b" providerId="AD" clId="Web-{4D929B99-296D-4D51-BFC8-D1D89556A194}" dt="2021-12-11T19:36:17.978" v="26" actId="20577"/>
-          <ac:spMkLst>
-            <pc:docMk/>
-            <pc:sldMk cId="3736161039" sldId="298"/>
-            <ac:spMk id="3" creationId="{785AE07D-EFFC-4FFB-A9B6-15773EDE24BA}"/>
-          </ac:spMkLst>
-        </pc:spChg>
       </pc:sldChg>
     </pc:docChg>
   </pc:docChgLst>
@@ -851,6 +851,222 @@
             <ac:spMk id="3" creationId="{1D1D979C-CDB2-47B1-BF7D-95DA6DA10331}"/>
           </ac:spMkLst>
         </pc:spChg>
+      </pc:sldChg>
+    </pc:docChg>
+  </pc:docChgLst>
+  <pc:docChgLst>
+    <pc:chgData name="Sam Wagner" userId="S::samanthawagner@unomaha.edu::16297234-fb1c-49cd-ab2e-a70cbd0c939b" providerId="AD" clId="Web-{40E95D6C-5DB6-40CE-B915-9A11429FE331}"/>
+    <pc:docChg chg="addSld delSld modSld sldOrd">
+      <pc:chgData name="Sam Wagner" userId="S::samanthawagner@unomaha.edu::16297234-fb1c-49cd-ab2e-a70cbd0c939b" providerId="AD" clId="Web-{40E95D6C-5DB6-40CE-B915-9A11429FE331}" dt="2021-12-14T02:25:26.839" v="172" actId="1076"/>
+      <pc:docMkLst>
+        <pc:docMk/>
+      </pc:docMkLst>
+      <pc:sldChg chg="addSp modSp ord">
+        <pc:chgData name="Sam Wagner" userId="S::samanthawagner@unomaha.edu::16297234-fb1c-49cd-ab2e-a70cbd0c939b" providerId="AD" clId="Web-{40E95D6C-5DB6-40CE-B915-9A11429FE331}" dt="2021-12-14T02:24:19.026" v="153" actId="1076"/>
+        <pc:sldMkLst>
+          <pc:docMk/>
+          <pc:sldMk cId="3142299172" sldId="288"/>
+        </pc:sldMkLst>
+        <pc:spChg chg="add mod">
+          <ac:chgData name="Sam Wagner" userId="S::samanthawagner@unomaha.edu::16297234-fb1c-49cd-ab2e-a70cbd0c939b" providerId="AD" clId="Web-{40E95D6C-5DB6-40CE-B915-9A11429FE331}" dt="2021-12-14T02:20:21.119" v="128" actId="14100"/>
+          <ac:spMkLst>
+            <pc:docMk/>
+            <pc:sldMk cId="3142299172" sldId="288"/>
+            <ac:spMk id="3" creationId="{B0625FA2-F5BD-4752-BCC7-EC74CE8AF4F5}"/>
+          </ac:spMkLst>
+        </pc:spChg>
+        <pc:spChg chg="add mod">
+          <ac:chgData name="Sam Wagner" userId="S::samanthawagner@unomaha.edu::16297234-fb1c-49cd-ab2e-a70cbd0c939b" providerId="AD" clId="Web-{40E95D6C-5DB6-40CE-B915-9A11429FE331}" dt="2021-12-14T02:24:19.026" v="153" actId="1076"/>
+          <ac:spMkLst>
+            <pc:docMk/>
+            <pc:sldMk cId="3142299172" sldId="288"/>
+            <ac:spMk id="5" creationId="{B0B1A478-19DF-4724-948F-ECC9A80C73A1}"/>
+          </ac:spMkLst>
+        </pc:spChg>
+        <pc:picChg chg="mod">
+          <ac:chgData name="Sam Wagner" userId="S::samanthawagner@unomaha.edu::16297234-fb1c-49cd-ab2e-a70cbd0c939b" providerId="AD" clId="Web-{40E95D6C-5DB6-40CE-B915-9A11429FE331}" dt="2021-12-14T02:19:26.321" v="52" actId="1076"/>
+          <ac:picMkLst>
+            <pc:docMk/>
+            <pc:sldMk cId="3142299172" sldId="288"/>
+            <ac:picMk id="4" creationId="{83DFAFA7-4664-4E48-9B71-6058A109AD46}"/>
+          </ac:picMkLst>
+        </pc:picChg>
+      </pc:sldChg>
+      <pc:sldChg chg="del">
+        <pc:chgData name="Sam Wagner" userId="S::samanthawagner@unomaha.edu::16297234-fb1c-49cd-ab2e-a70cbd0c939b" providerId="AD" clId="Web-{40E95D6C-5DB6-40CE-B915-9A11429FE331}" dt="2021-12-14T02:18:52.259" v="51"/>
+        <pc:sldMkLst>
+          <pc:docMk/>
+          <pc:sldMk cId="3854946920" sldId="292"/>
+        </pc:sldMkLst>
+      </pc:sldChg>
+      <pc:sldChg chg="delSp ord">
+        <pc:chgData name="Sam Wagner" userId="S::samanthawagner@unomaha.edu::16297234-fb1c-49cd-ab2e-a70cbd0c939b" providerId="AD" clId="Web-{40E95D6C-5DB6-40CE-B915-9A11429FE331}" dt="2021-12-14T02:24:55.276" v="160"/>
+        <pc:sldMkLst>
+          <pc:docMk/>
+          <pc:sldMk cId="1073521535" sldId="301"/>
+        </pc:sldMkLst>
+        <pc:picChg chg="del">
+          <ac:chgData name="Sam Wagner" userId="S::samanthawagner@unomaha.edu::16297234-fb1c-49cd-ab2e-a70cbd0c939b" providerId="AD" clId="Web-{40E95D6C-5DB6-40CE-B915-9A11429FE331}" dt="2021-12-14T02:24:55.276" v="160"/>
+          <ac:picMkLst>
+            <pc:docMk/>
+            <pc:sldMk cId="1073521535" sldId="301"/>
+            <ac:picMk id="5" creationId="{0B7F5430-DB12-4831-9D70-4D10D29FD9C4}"/>
+          </ac:picMkLst>
+        </pc:picChg>
+      </pc:sldChg>
+      <pc:sldChg chg="addSp modSp del">
+        <pc:chgData name="Sam Wagner" userId="S::samanthawagner@unomaha.edu::16297234-fb1c-49cd-ab2e-a70cbd0c939b" providerId="AD" clId="Web-{40E95D6C-5DB6-40CE-B915-9A11429FE331}" dt="2021-12-14T02:24:26.214" v="155"/>
+        <pc:sldMkLst>
+          <pc:docMk/>
+          <pc:sldMk cId="916843013" sldId="302"/>
+        </pc:sldMkLst>
+        <pc:spChg chg="add mod">
+          <ac:chgData name="Sam Wagner" userId="S::samanthawagner@unomaha.edu::16297234-fb1c-49cd-ab2e-a70cbd0c939b" providerId="AD" clId="Web-{40E95D6C-5DB6-40CE-B915-9A11429FE331}" dt="2021-12-14T02:22:59.463" v="141" actId="20577"/>
+          <ac:spMkLst>
+            <pc:docMk/>
+            <pc:sldMk cId="916843013" sldId="302"/>
+            <ac:spMk id="3" creationId="{EED8C3EA-F459-4230-9301-F3A904931F00}"/>
+          </ac:spMkLst>
+        </pc:spChg>
+        <pc:picChg chg="mod">
+          <ac:chgData name="Sam Wagner" userId="S::samanthawagner@unomaha.edu::16297234-fb1c-49cd-ab2e-a70cbd0c939b" providerId="AD" clId="Web-{40E95D6C-5DB6-40CE-B915-9A11429FE331}" dt="2021-12-14T02:23:07.620" v="144" actId="1076"/>
+          <ac:picMkLst>
+            <pc:docMk/>
+            <pc:sldMk cId="916843013" sldId="302"/>
+            <ac:picMk id="5" creationId="{0B7F5430-DB12-4831-9D70-4D10D29FD9C4}"/>
+          </ac:picMkLst>
+        </pc:picChg>
+      </pc:sldChg>
+      <pc:sldChg chg="addSp delSp modSp ord">
+        <pc:chgData name="Sam Wagner" userId="S::samanthawagner@unomaha.edu::16297234-fb1c-49cd-ab2e-a70cbd0c939b" providerId="AD" clId="Web-{40E95D6C-5DB6-40CE-B915-9A11429FE331}" dt="2021-12-14T02:24:50.745" v="159" actId="20577"/>
+        <pc:sldMkLst>
+          <pc:docMk/>
+          <pc:sldMk cId="988239217" sldId="303"/>
+        </pc:sldMkLst>
+        <pc:spChg chg="add">
+          <ac:chgData name="Sam Wagner" userId="S::samanthawagner@unomaha.edu::16297234-fb1c-49cd-ab2e-a70cbd0c939b" providerId="AD" clId="Web-{40E95D6C-5DB6-40CE-B915-9A11429FE331}" dt="2021-12-14T02:14:45.055" v="33"/>
+          <ac:spMkLst>
+            <pc:docMk/>
+            <pc:sldMk cId="988239217" sldId="303"/>
+            <ac:spMk id="3" creationId="{11C84A0D-BA5E-4BD3-B6E9-A8F411EC10E9}"/>
+          </ac:spMkLst>
+        </pc:spChg>
+        <pc:spChg chg="add mod">
+          <ac:chgData name="Sam Wagner" userId="S::samanthawagner@unomaha.edu::16297234-fb1c-49cd-ab2e-a70cbd0c939b" providerId="AD" clId="Web-{40E95D6C-5DB6-40CE-B915-9A11429FE331}" dt="2021-12-14T02:24:50.745" v="159" actId="20577"/>
+          <ac:spMkLst>
+            <pc:docMk/>
+            <pc:sldMk cId="988239217" sldId="303"/>
+            <ac:spMk id="5" creationId="{89894F47-78AF-4D0A-BF8B-8B79C57FF7B9}"/>
+          </ac:spMkLst>
+        </pc:spChg>
+        <pc:spChg chg="add del mod">
+          <ac:chgData name="Sam Wagner" userId="S::samanthawagner@unomaha.edu::16297234-fb1c-49cd-ab2e-a70cbd0c939b" providerId="AD" clId="Web-{40E95D6C-5DB6-40CE-B915-9A11429FE331}" dt="2021-12-14T02:15:42.680" v="42"/>
+          <ac:spMkLst>
+            <pc:docMk/>
+            <pc:sldMk cId="988239217" sldId="303"/>
+            <ac:spMk id="6" creationId="{332275C1-D574-4F97-8BE9-AFA393ECEDE0}"/>
+          </ac:spMkLst>
+        </pc:spChg>
+        <pc:spChg chg="add del">
+          <ac:chgData name="Sam Wagner" userId="S::samanthawagner@unomaha.edu::16297234-fb1c-49cd-ab2e-a70cbd0c939b" providerId="AD" clId="Web-{40E95D6C-5DB6-40CE-B915-9A11429FE331}" dt="2021-12-14T02:15:37.055" v="40"/>
+          <ac:spMkLst>
+            <pc:docMk/>
+            <pc:sldMk cId="988239217" sldId="303"/>
+            <ac:spMk id="7" creationId="{E411B13D-862D-48F9-965A-7DCB5E12F61C}"/>
+          </ac:spMkLst>
+        </pc:spChg>
+        <pc:picChg chg="mod">
+          <ac:chgData name="Sam Wagner" userId="S::samanthawagner@unomaha.edu::16297234-fb1c-49cd-ab2e-a70cbd0c939b" providerId="AD" clId="Web-{40E95D6C-5DB6-40CE-B915-9A11429FE331}" dt="2021-12-14T02:14:40.992" v="32" actId="1076"/>
+          <ac:picMkLst>
+            <pc:docMk/>
+            <pc:sldMk cId="988239217" sldId="303"/>
+            <ac:picMk id="4" creationId="{8E7E0A41-E67E-44D2-A675-FFD29884CB71}"/>
+          </ac:picMkLst>
+        </pc:picChg>
+      </pc:sldChg>
+      <pc:sldChg chg="addSp delSp modSp add replId">
+        <pc:chgData name="Sam Wagner" userId="S::samanthawagner@unomaha.edu::16297234-fb1c-49cd-ab2e-a70cbd0c939b" providerId="AD" clId="Web-{40E95D6C-5DB6-40CE-B915-9A11429FE331}" dt="2021-12-14T02:23:59.635" v="151" actId="20577"/>
+        <pc:sldMkLst>
+          <pc:docMk/>
+          <pc:sldMk cId="3690917875" sldId="304"/>
+        </pc:sldMkLst>
+        <pc:spChg chg="mod">
+          <ac:chgData name="Sam Wagner" userId="S::samanthawagner@unomaha.edu::16297234-fb1c-49cd-ab2e-a70cbd0c939b" providerId="AD" clId="Web-{40E95D6C-5DB6-40CE-B915-9A11429FE331}" dt="2021-12-14T02:23:59.635" v="151" actId="20577"/>
+          <ac:spMkLst>
+            <pc:docMk/>
+            <pc:sldMk cId="3690917875" sldId="304"/>
+            <ac:spMk id="9" creationId="{9ED261F0-F2B3-4340-996D-BD6E6E6815AE}"/>
+          </ac:spMkLst>
+        </pc:spChg>
+        <pc:picChg chg="add mod">
+          <ac:chgData name="Sam Wagner" userId="S::samanthawagner@unomaha.edu::16297234-fb1c-49cd-ab2e-a70cbd0c939b" providerId="AD" clId="Web-{40E95D6C-5DB6-40CE-B915-9A11429FE331}" dt="2021-12-14T02:23:48.745" v="148" actId="1076"/>
+          <ac:picMkLst>
+            <pc:docMk/>
+            <pc:sldMk cId="3690917875" sldId="304"/>
+            <ac:picMk id="3" creationId="{F2F69BAE-40A9-4086-A197-172197D8E6ED}"/>
+          </ac:picMkLst>
+        </pc:picChg>
+        <pc:picChg chg="del">
+          <ac:chgData name="Sam Wagner" userId="S::samanthawagner@unomaha.edu::16297234-fb1c-49cd-ab2e-a70cbd0c939b" providerId="AD" clId="Web-{40E95D6C-5DB6-40CE-B915-9A11429FE331}" dt="2021-12-14T02:23:46.151" v="147"/>
+          <ac:picMkLst>
+            <pc:docMk/>
+            <pc:sldMk cId="3690917875" sldId="304"/>
+            <ac:picMk id="4" creationId="{171D6054-E31C-4F93-9B54-1667844C323B}"/>
+          </ac:picMkLst>
+        </pc:picChg>
+      </pc:sldChg>
+      <pc:sldChg chg="addSp delSp modSp add del ord replId">
+        <pc:chgData name="Sam Wagner" userId="S::samanthawagner@unomaha.edu::16297234-fb1c-49cd-ab2e-a70cbd0c939b" providerId="AD" clId="Web-{40E95D6C-5DB6-40CE-B915-9A11429FE331}" dt="2021-12-14T02:16:53.618" v="50"/>
+        <pc:sldMkLst>
+          <pc:docMk/>
+          <pc:sldMk cId="4058285459" sldId="304"/>
+        </pc:sldMkLst>
+        <pc:spChg chg="add mod">
+          <ac:chgData name="Sam Wagner" userId="S::samanthawagner@unomaha.edu::16297234-fb1c-49cd-ab2e-a70cbd0c939b" providerId="AD" clId="Web-{40E95D6C-5DB6-40CE-B915-9A11429FE331}" dt="2021-12-14T02:14:09.867" v="30" actId="20577"/>
+          <ac:spMkLst>
+            <pc:docMk/>
+            <pc:sldMk cId="4058285459" sldId="304"/>
+            <ac:spMk id="3" creationId="{1FD16183-6468-4A1A-8B27-DBD130BB9708}"/>
+          </ac:spMkLst>
+        </pc:spChg>
+        <pc:picChg chg="del">
+          <ac:chgData name="Sam Wagner" userId="S::samanthawagner@unomaha.edu::16297234-fb1c-49cd-ab2e-a70cbd0c939b" providerId="AD" clId="Web-{40E95D6C-5DB6-40CE-B915-9A11429FE331}" dt="2021-12-14T02:13:06.023" v="3"/>
+          <ac:picMkLst>
+            <pc:docMk/>
+            <pc:sldMk cId="4058285459" sldId="304"/>
+            <ac:picMk id="5" creationId="{0B7F5430-DB12-4831-9D70-4D10D29FD9C4}"/>
+          </ac:picMkLst>
+        </pc:picChg>
+      </pc:sldChg>
+      <pc:sldChg chg="addSp delSp modSp add replId">
+        <pc:chgData name="Sam Wagner" userId="S::samanthawagner@unomaha.edu::16297234-fb1c-49cd-ab2e-a70cbd0c939b" providerId="AD" clId="Web-{40E95D6C-5DB6-40CE-B915-9A11429FE331}" dt="2021-12-14T02:25:26.839" v="172" actId="1076"/>
+        <pc:sldMkLst>
+          <pc:docMk/>
+          <pc:sldMk cId="110576765" sldId="305"/>
+        </pc:sldMkLst>
+        <pc:picChg chg="del">
+          <ac:chgData name="Sam Wagner" userId="S::samanthawagner@unomaha.edu::16297234-fb1c-49cd-ab2e-a70cbd0c939b" providerId="AD" clId="Web-{40E95D6C-5DB6-40CE-B915-9A11429FE331}" dt="2021-12-14T02:25:05.276" v="162"/>
+          <ac:picMkLst>
+            <pc:docMk/>
+            <pc:sldMk cId="110576765" sldId="305"/>
+            <ac:picMk id="3" creationId="{F2F69BAE-40A9-4086-A197-172197D8E6ED}"/>
+          </ac:picMkLst>
+        </pc:picChg>
+        <pc:picChg chg="add del mod">
+          <ac:chgData name="Sam Wagner" userId="S::samanthawagner@unomaha.edu::16297234-fb1c-49cd-ab2e-a70cbd0c939b" providerId="AD" clId="Web-{40E95D6C-5DB6-40CE-B915-9A11429FE331}" dt="2021-12-14T02:25:26.839" v="172" actId="1076"/>
+          <ac:picMkLst>
+            <pc:docMk/>
+            <pc:sldMk cId="110576765" sldId="305"/>
+            <ac:picMk id="4" creationId="{ADAACC1A-6D6C-457E-A868-BE60CA8ADF49}"/>
+          </ac:picMkLst>
+        </pc:picChg>
+      </pc:sldChg>
+      <pc:sldChg chg="new del">
+        <pc:chgData name="Sam Wagner" userId="S::samanthawagner@unomaha.edu::16297234-fb1c-49cd-ab2e-a70cbd0c939b" providerId="AD" clId="Web-{40E95D6C-5DB6-40CE-B915-9A11429FE331}" dt="2021-12-14T02:15:09.836" v="35"/>
+        <pc:sldMkLst>
+          <pc:docMk/>
+          <pc:sldMk cId="2554028201" sldId="305"/>
+        </pc:sldMkLst>
       </pc:sldChg>
     </pc:docChg>
   </pc:docChgLst>
@@ -980,222 +1196,6 @@
             <ac:spMk id="2" creationId="{4E79CB38-64FB-47D5-A599-ED6F50A4D15F}"/>
           </ac:spMkLst>
         </pc:spChg>
-      </pc:sldChg>
-    </pc:docChg>
-  </pc:docChgLst>
-  <pc:docChgLst>
-    <pc:chgData name="Sam Wagner" userId="S::samanthawagner@unomaha.edu::16297234-fb1c-49cd-ab2e-a70cbd0c939b" providerId="AD" clId="Web-{40E95D6C-5DB6-40CE-B915-9A11429FE331}"/>
-    <pc:docChg chg="addSld delSld modSld sldOrd">
-      <pc:chgData name="Sam Wagner" userId="S::samanthawagner@unomaha.edu::16297234-fb1c-49cd-ab2e-a70cbd0c939b" providerId="AD" clId="Web-{40E95D6C-5DB6-40CE-B915-9A11429FE331}" dt="2021-12-14T02:25:26.839" v="172" actId="1076"/>
-      <pc:docMkLst>
-        <pc:docMk/>
-      </pc:docMkLst>
-      <pc:sldChg chg="addSp modSp ord">
-        <pc:chgData name="Sam Wagner" userId="S::samanthawagner@unomaha.edu::16297234-fb1c-49cd-ab2e-a70cbd0c939b" providerId="AD" clId="Web-{40E95D6C-5DB6-40CE-B915-9A11429FE331}" dt="2021-12-14T02:24:19.026" v="153" actId="1076"/>
-        <pc:sldMkLst>
-          <pc:docMk/>
-          <pc:sldMk cId="3142299172" sldId="288"/>
-        </pc:sldMkLst>
-        <pc:spChg chg="add mod">
-          <ac:chgData name="Sam Wagner" userId="S::samanthawagner@unomaha.edu::16297234-fb1c-49cd-ab2e-a70cbd0c939b" providerId="AD" clId="Web-{40E95D6C-5DB6-40CE-B915-9A11429FE331}" dt="2021-12-14T02:20:21.119" v="128" actId="14100"/>
-          <ac:spMkLst>
-            <pc:docMk/>
-            <pc:sldMk cId="3142299172" sldId="288"/>
-            <ac:spMk id="3" creationId="{B0625FA2-F5BD-4752-BCC7-EC74CE8AF4F5}"/>
-          </ac:spMkLst>
-        </pc:spChg>
-        <pc:spChg chg="add mod">
-          <ac:chgData name="Sam Wagner" userId="S::samanthawagner@unomaha.edu::16297234-fb1c-49cd-ab2e-a70cbd0c939b" providerId="AD" clId="Web-{40E95D6C-5DB6-40CE-B915-9A11429FE331}" dt="2021-12-14T02:24:19.026" v="153" actId="1076"/>
-          <ac:spMkLst>
-            <pc:docMk/>
-            <pc:sldMk cId="3142299172" sldId="288"/>
-            <ac:spMk id="5" creationId="{B0B1A478-19DF-4724-948F-ECC9A80C73A1}"/>
-          </ac:spMkLst>
-        </pc:spChg>
-        <pc:picChg chg="mod">
-          <ac:chgData name="Sam Wagner" userId="S::samanthawagner@unomaha.edu::16297234-fb1c-49cd-ab2e-a70cbd0c939b" providerId="AD" clId="Web-{40E95D6C-5DB6-40CE-B915-9A11429FE331}" dt="2021-12-14T02:19:26.321" v="52" actId="1076"/>
-          <ac:picMkLst>
-            <pc:docMk/>
-            <pc:sldMk cId="3142299172" sldId="288"/>
-            <ac:picMk id="4" creationId="{83DFAFA7-4664-4E48-9B71-6058A109AD46}"/>
-          </ac:picMkLst>
-        </pc:picChg>
-      </pc:sldChg>
-      <pc:sldChg chg="del">
-        <pc:chgData name="Sam Wagner" userId="S::samanthawagner@unomaha.edu::16297234-fb1c-49cd-ab2e-a70cbd0c939b" providerId="AD" clId="Web-{40E95D6C-5DB6-40CE-B915-9A11429FE331}" dt="2021-12-14T02:18:52.259" v="51"/>
-        <pc:sldMkLst>
-          <pc:docMk/>
-          <pc:sldMk cId="3854946920" sldId="292"/>
-        </pc:sldMkLst>
-      </pc:sldChg>
-      <pc:sldChg chg="delSp ord">
-        <pc:chgData name="Sam Wagner" userId="S::samanthawagner@unomaha.edu::16297234-fb1c-49cd-ab2e-a70cbd0c939b" providerId="AD" clId="Web-{40E95D6C-5DB6-40CE-B915-9A11429FE331}" dt="2021-12-14T02:24:55.276" v="160"/>
-        <pc:sldMkLst>
-          <pc:docMk/>
-          <pc:sldMk cId="1073521535" sldId="301"/>
-        </pc:sldMkLst>
-        <pc:picChg chg="del">
-          <ac:chgData name="Sam Wagner" userId="S::samanthawagner@unomaha.edu::16297234-fb1c-49cd-ab2e-a70cbd0c939b" providerId="AD" clId="Web-{40E95D6C-5DB6-40CE-B915-9A11429FE331}" dt="2021-12-14T02:24:55.276" v="160"/>
-          <ac:picMkLst>
-            <pc:docMk/>
-            <pc:sldMk cId="1073521535" sldId="301"/>
-            <ac:picMk id="5" creationId="{0B7F5430-DB12-4831-9D70-4D10D29FD9C4}"/>
-          </ac:picMkLst>
-        </pc:picChg>
-      </pc:sldChg>
-      <pc:sldChg chg="addSp modSp del">
-        <pc:chgData name="Sam Wagner" userId="S::samanthawagner@unomaha.edu::16297234-fb1c-49cd-ab2e-a70cbd0c939b" providerId="AD" clId="Web-{40E95D6C-5DB6-40CE-B915-9A11429FE331}" dt="2021-12-14T02:24:26.214" v="155"/>
-        <pc:sldMkLst>
-          <pc:docMk/>
-          <pc:sldMk cId="916843013" sldId="302"/>
-        </pc:sldMkLst>
-        <pc:spChg chg="add mod">
-          <ac:chgData name="Sam Wagner" userId="S::samanthawagner@unomaha.edu::16297234-fb1c-49cd-ab2e-a70cbd0c939b" providerId="AD" clId="Web-{40E95D6C-5DB6-40CE-B915-9A11429FE331}" dt="2021-12-14T02:22:59.463" v="141" actId="20577"/>
-          <ac:spMkLst>
-            <pc:docMk/>
-            <pc:sldMk cId="916843013" sldId="302"/>
-            <ac:spMk id="3" creationId="{EED8C3EA-F459-4230-9301-F3A904931F00}"/>
-          </ac:spMkLst>
-        </pc:spChg>
-        <pc:picChg chg="mod">
-          <ac:chgData name="Sam Wagner" userId="S::samanthawagner@unomaha.edu::16297234-fb1c-49cd-ab2e-a70cbd0c939b" providerId="AD" clId="Web-{40E95D6C-5DB6-40CE-B915-9A11429FE331}" dt="2021-12-14T02:23:07.620" v="144" actId="1076"/>
-          <ac:picMkLst>
-            <pc:docMk/>
-            <pc:sldMk cId="916843013" sldId="302"/>
-            <ac:picMk id="5" creationId="{0B7F5430-DB12-4831-9D70-4D10D29FD9C4}"/>
-          </ac:picMkLst>
-        </pc:picChg>
-      </pc:sldChg>
-      <pc:sldChg chg="addSp delSp modSp ord">
-        <pc:chgData name="Sam Wagner" userId="S::samanthawagner@unomaha.edu::16297234-fb1c-49cd-ab2e-a70cbd0c939b" providerId="AD" clId="Web-{40E95D6C-5DB6-40CE-B915-9A11429FE331}" dt="2021-12-14T02:24:50.745" v="159" actId="20577"/>
-        <pc:sldMkLst>
-          <pc:docMk/>
-          <pc:sldMk cId="988239217" sldId="303"/>
-        </pc:sldMkLst>
-        <pc:spChg chg="add">
-          <ac:chgData name="Sam Wagner" userId="S::samanthawagner@unomaha.edu::16297234-fb1c-49cd-ab2e-a70cbd0c939b" providerId="AD" clId="Web-{40E95D6C-5DB6-40CE-B915-9A11429FE331}" dt="2021-12-14T02:14:45.055" v="33"/>
-          <ac:spMkLst>
-            <pc:docMk/>
-            <pc:sldMk cId="988239217" sldId="303"/>
-            <ac:spMk id="3" creationId="{11C84A0D-BA5E-4BD3-B6E9-A8F411EC10E9}"/>
-          </ac:spMkLst>
-        </pc:spChg>
-        <pc:spChg chg="add mod">
-          <ac:chgData name="Sam Wagner" userId="S::samanthawagner@unomaha.edu::16297234-fb1c-49cd-ab2e-a70cbd0c939b" providerId="AD" clId="Web-{40E95D6C-5DB6-40CE-B915-9A11429FE331}" dt="2021-12-14T02:24:50.745" v="159" actId="20577"/>
-          <ac:spMkLst>
-            <pc:docMk/>
-            <pc:sldMk cId="988239217" sldId="303"/>
-            <ac:spMk id="5" creationId="{89894F47-78AF-4D0A-BF8B-8B79C57FF7B9}"/>
-          </ac:spMkLst>
-        </pc:spChg>
-        <pc:spChg chg="add del mod">
-          <ac:chgData name="Sam Wagner" userId="S::samanthawagner@unomaha.edu::16297234-fb1c-49cd-ab2e-a70cbd0c939b" providerId="AD" clId="Web-{40E95D6C-5DB6-40CE-B915-9A11429FE331}" dt="2021-12-14T02:15:42.680" v="42"/>
-          <ac:spMkLst>
-            <pc:docMk/>
-            <pc:sldMk cId="988239217" sldId="303"/>
-            <ac:spMk id="6" creationId="{332275C1-D574-4F97-8BE9-AFA393ECEDE0}"/>
-          </ac:spMkLst>
-        </pc:spChg>
-        <pc:spChg chg="add del">
-          <ac:chgData name="Sam Wagner" userId="S::samanthawagner@unomaha.edu::16297234-fb1c-49cd-ab2e-a70cbd0c939b" providerId="AD" clId="Web-{40E95D6C-5DB6-40CE-B915-9A11429FE331}" dt="2021-12-14T02:15:37.055" v="40"/>
-          <ac:spMkLst>
-            <pc:docMk/>
-            <pc:sldMk cId="988239217" sldId="303"/>
-            <ac:spMk id="7" creationId="{E411B13D-862D-48F9-965A-7DCB5E12F61C}"/>
-          </ac:spMkLst>
-        </pc:spChg>
-        <pc:picChg chg="mod">
-          <ac:chgData name="Sam Wagner" userId="S::samanthawagner@unomaha.edu::16297234-fb1c-49cd-ab2e-a70cbd0c939b" providerId="AD" clId="Web-{40E95D6C-5DB6-40CE-B915-9A11429FE331}" dt="2021-12-14T02:14:40.992" v="32" actId="1076"/>
-          <ac:picMkLst>
-            <pc:docMk/>
-            <pc:sldMk cId="988239217" sldId="303"/>
-            <ac:picMk id="4" creationId="{8E7E0A41-E67E-44D2-A675-FFD29884CB71}"/>
-          </ac:picMkLst>
-        </pc:picChg>
-      </pc:sldChg>
-      <pc:sldChg chg="addSp delSp modSp add replId">
-        <pc:chgData name="Sam Wagner" userId="S::samanthawagner@unomaha.edu::16297234-fb1c-49cd-ab2e-a70cbd0c939b" providerId="AD" clId="Web-{40E95D6C-5DB6-40CE-B915-9A11429FE331}" dt="2021-12-14T02:23:59.635" v="151" actId="20577"/>
-        <pc:sldMkLst>
-          <pc:docMk/>
-          <pc:sldMk cId="3690917875" sldId="304"/>
-        </pc:sldMkLst>
-        <pc:spChg chg="mod">
-          <ac:chgData name="Sam Wagner" userId="S::samanthawagner@unomaha.edu::16297234-fb1c-49cd-ab2e-a70cbd0c939b" providerId="AD" clId="Web-{40E95D6C-5DB6-40CE-B915-9A11429FE331}" dt="2021-12-14T02:23:59.635" v="151" actId="20577"/>
-          <ac:spMkLst>
-            <pc:docMk/>
-            <pc:sldMk cId="3690917875" sldId="304"/>
-            <ac:spMk id="9" creationId="{9ED261F0-F2B3-4340-996D-BD6E6E6815AE}"/>
-          </ac:spMkLst>
-        </pc:spChg>
-        <pc:picChg chg="add mod">
-          <ac:chgData name="Sam Wagner" userId="S::samanthawagner@unomaha.edu::16297234-fb1c-49cd-ab2e-a70cbd0c939b" providerId="AD" clId="Web-{40E95D6C-5DB6-40CE-B915-9A11429FE331}" dt="2021-12-14T02:23:48.745" v="148" actId="1076"/>
-          <ac:picMkLst>
-            <pc:docMk/>
-            <pc:sldMk cId="3690917875" sldId="304"/>
-            <ac:picMk id="3" creationId="{F2F69BAE-40A9-4086-A197-172197D8E6ED}"/>
-          </ac:picMkLst>
-        </pc:picChg>
-        <pc:picChg chg="del">
-          <ac:chgData name="Sam Wagner" userId="S::samanthawagner@unomaha.edu::16297234-fb1c-49cd-ab2e-a70cbd0c939b" providerId="AD" clId="Web-{40E95D6C-5DB6-40CE-B915-9A11429FE331}" dt="2021-12-14T02:23:46.151" v="147"/>
-          <ac:picMkLst>
-            <pc:docMk/>
-            <pc:sldMk cId="3690917875" sldId="304"/>
-            <ac:picMk id="4" creationId="{171D6054-E31C-4F93-9B54-1667844C323B}"/>
-          </ac:picMkLst>
-        </pc:picChg>
-      </pc:sldChg>
-      <pc:sldChg chg="addSp delSp modSp add del ord replId">
-        <pc:chgData name="Sam Wagner" userId="S::samanthawagner@unomaha.edu::16297234-fb1c-49cd-ab2e-a70cbd0c939b" providerId="AD" clId="Web-{40E95D6C-5DB6-40CE-B915-9A11429FE331}" dt="2021-12-14T02:16:53.618" v="50"/>
-        <pc:sldMkLst>
-          <pc:docMk/>
-          <pc:sldMk cId="4058285459" sldId="304"/>
-        </pc:sldMkLst>
-        <pc:spChg chg="add mod">
-          <ac:chgData name="Sam Wagner" userId="S::samanthawagner@unomaha.edu::16297234-fb1c-49cd-ab2e-a70cbd0c939b" providerId="AD" clId="Web-{40E95D6C-5DB6-40CE-B915-9A11429FE331}" dt="2021-12-14T02:14:09.867" v="30" actId="20577"/>
-          <ac:spMkLst>
-            <pc:docMk/>
-            <pc:sldMk cId="4058285459" sldId="304"/>
-            <ac:spMk id="3" creationId="{1FD16183-6468-4A1A-8B27-DBD130BB9708}"/>
-          </ac:spMkLst>
-        </pc:spChg>
-        <pc:picChg chg="del">
-          <ac:chgData name="Sam Wagner" userId="S::samanthawagner@unomaha.edu::16297234-fb1c-49cd-ab2e-a70cbd0c939b" providerId="AD" clId="Web-{40E95D6C-5DB6-40CE-B915-9A11429FE331}" dt="2021-12-14T02:13:06.023" v="3"/>
-          <ac:picMkLst>
-            <pc:docMk/>
-            <pc:sldMk cId="4058285459" sldId="304"/>
-            <ac:picMk id="5" creationId="{0B7F5430-DB12-4831-9D70-4D10D29FD9C4}"/>
-          </ac:picMkLst>
-        </pc:picChg>
-      </pc:sldChg>
-      <pc:sldChg chg="addSp delSp modSp add replId">
-        <pc:chgData name="Sam Wagner" userId="S::samanthawagner@unomaha.edu::16297234-fb1c-49cd-ab2e-a70cbd0c939b" providerId="AD" clId="Web-{40E95D6C-5DB6-40CE-B915-9A11429FE331}" dt="2021-12-14T02:25:26.839" v="172" actId="1076"/>
-        <pc:sldMkLst>
-          <pc:docMk/>
-          <pc:sldMk cId="110576765" sldId="305"/>
-        </pc:sldMkLst>
-        <pc:picChg chg="del">
-          <ac:chgData name="Sam Wagner" userId="S::samanthawagner@unomaha.edu::16297234-fb1c-49cd-ab2e-a70cbd0c939b" providerId="AD" clId="Web-{40E95D6C-5DB6-40CE-B915-9A11429FE331}" dt="2021-12-14T02:25:05.276" v="162"/>
-          <ac:picMkLst>
-            <pc:docMk/>
-            <pc:sldMk cId="110576765" sldId="305"/>
-            <ac:picMk id="3" creationId="{F2F69BAE-40A9-4086-A197-172197D8E6ED}"/>
-          </ac:picMkLst>
-        </pc:picChg>
-        <pc:picChg chg="add del mod">
-          <ac:chgData name="Sam Wagner" userId="S::samanthawagner@unomaha.edu::16297234-fb1c-49cd-ab2e-a70cbd0c939b" providerId="AD" clId="Web-{40E95D6C-5DB6-40CE-B915-9A11429FE331}" dt="2021-12-14T02:25:26.839" v="172" actId="1076"/>
-          <ac:picMkLst>
-            <pc:docMk/>
-            <pc:sldMk cId="110576765" sldId="305"/>
-            <ac:picMk id="4" creationId="{ADAACC1A-6D6C-457E-A868-BE60CA8ADF49}"/>
-          </ac:picMkLst>
-        </pc:picChg>
-      </pc:sldChg>
-      <pc:sldChg chg="new del">
-        <pc:chgData name="Sam Wagner" userId="S::samanthawagner@unomaha.edu::16297234-fb1c-49cd-ab2e-a70cbd0c939b" providerId="AD" clId="Web-{40E95D6C-5DB6-40CE-B915-9A11429FE331}" dt="2021-12-14T02:15:09.836" v="35"/>
-        <pc:sldMkLst>
-          <pc:docMk/>
-          <pc:sldMk cId="2554028201" sldId="305"/>
-        </pc:sldMkLst>
       </pc:sldChg>
     </pc:docChg>
   </pc:docChgLst>
@@ -10523,7 +10523,7 @@
           <a:p>
             <a:fld id="{9184DA70-C731-4C70-880D-CCD4705E623C}" type="datetime1">
               <a:rPr lang="en-US" smtClean="0"/>
-              <a:t>12/13/2021</a:t>
+              <a:t>12/14/2021</a:t>
             </a:fld>
             <a:endParaRPr lang="en-US"/>
           </a:p>
@@ -10709,7 +10709,7 @@
           <a:p>
             <a:fld id="{4BE1D723-8F53-4F53-90B0-1982A396982E}" type="datetime1">
               <a:rPr lang="en-US" smtClean="0"/>
-              <a:t>12/13/2021</a:t>
+              <a:t>12/14/2021</a:t>
             </a:fld>
             <a:endParaRPr lang="en-US"/>
           </a:p>
@@ -11081,7 +11081,7 @@
           <a:p>
             <a:fld id="{97669AF7-7BEB-44E4-9852-375E34362B5B}" type="datetime1">
               <a:rPr lang="en-US" smtClean="0"/>
-              <a:t>12/13/2021</a:t>
+              <a:t>12/14/2021</a:t>
             </a:fld>
             <a:endParaRPr lang="en-US"/>
           </a:p>
@@ -11333,7 +11333,7 @@
           <a:p>
             <a:fld id="{BAAAC38D-0552-4C82-B593-E6124DFADBE2}" type="datetime1">
               <a:rPr lang="en-US" smtClean="0"/>
-              <a:t>12/13/2021</a:t>
+              <a:t>12/14/2021</a:t>
             </a:fld>
             <a:endParaRPr lang="en-US"/>
           </a:p>
@@ -11727,7 +11727,7 @@
           <a:p>
             <a:fld id="{D9DF0F1C-5577-4ACB-BB62-DF8F3C494C7E}" type="datetime1">
               <a:rPr lang="en-US" smtClean="0"/>
-              <a:t>12/13/2021</a:t>
+              <a:t>12/14/2021</a:t>
             </a:fld>
             <a:endParaRPr lang="en-US"/>
           </a:p>
@@ -11862,7 +11862,7 @@
           <a:p>
             <a:fld id="{1775B394-D9F9-4F0C-B15D-605F45CB9E9F}" type="datetime1">
               <a:rPr lang="en-US" smtClean="0"/>
-              <a:t>12/13/2021</a:t>
+              <a:t>12/14/2021</a:t>
             </a:fld>
             <a:endParaRPr lang="en-US"/>
           </a:p>
@@ -12019,7 +12019,7 @@
           <a:p>
             <a:fld id="{39667345-2558-425A-8533-9BFDBCE15005}" type="datetime1">
               <a:rPr lang="en-US" smtClean="0"/>
-              <a:t>12/13/2021</a:t>
+              <a:t>12/14/2021</a:t>
             </a:fld>
             <a:endParaRPr lang="en-US"/>
           </a:p>
@@ -12346,7 +12346,7 @@
           <a:p>
             <a:fld id="{92BEA474-078D-4E9B-9B14-09A87B19DC46}" type="datetime1">
               <a:rPr lang="en-US" smtClean="0"/>
-              <a:t>12/13/2021</a:t>
+              <a:t>12/14/2021</a:t>
             </a:fld>
             <a:endParaRPr lang="en-US"/>
           </a:p>
@@ -12694,7 +12694,7 @@
           <a:p>
             <a:fld id="{4907D986-8816-4272-A432-0437A28A9828}" type="datetime1">
               <a:rPr lang="en-US" smtClean="0"/>
-              <a:t>12/13/2021</a:t>
+              <a:t>12/14/2021</a:t>
             </a:fld>
             <a:endParaRPr lang="en-US"/>
           </a:p>
@@ -12953,7 +12953,7 @@
           <a:p>
             <a:fld id="{62D6E202-B606-4609-B914-27C9371A1F6D}" type="datetime1">
               <a:rPr lang="en-US" smtClean="0"/>
-              <a:t>12/13/2021</a:t>
+              <a:t>12/14/2021</a:t>
             </a:fld>
             <a:endParaRPr lang="en-US"/>
           </a:p>
@@ -16687,7 +16687,7 @@
               <a:buChar char="o"/>
             </a:pPr>
             <a:r>
-              <a:rPr lang="en-US" sz="2000"/>
+              <a:rPr lang="en-US" sz="2000" dirty="0"/>
               <a:t>About the TTP</a:t>
             </a:r>
           </a:p>
@@ -16697,10 +16697,10 @@
               <a:buChar char="o"/>
             </a:pPr>
             <a:r>
-              <a:rPr lang="en-US" sz="2000"/>
+              <a:rPr lang="en-US" sz="2000" dirty="0"/>
               <a:t>Results</a:t>
             </a:r>
-            <a:endParaRPr lang="en-US"/>
+            <a:endParaRPr lang="en-US" dirty="0"/>
           </a:p>
           <a:p>
             <a:pPr>
@@ -16708,7 +16708,7 @@
               <a:buChar char="o"/>
             </a:pPr>
             <a:r>
-              <a:rPr lang="en-US" sz="2000"/>
+              <a:rPr lang="en-US" sz="2000" dirty="0"/>
               <a:t>Preparing the Data &amp; Data Exploration</a:t>
             </a:r>
           </a:p>
@@ -16718,7 +16718,7 @@
               <a:buChar char="o"/>
             </a:pPr>
             <a:r>
-              <a:rPr lang="en-US" sz="2000"/>
+              <a:rPr lang="en-US" sz="2000" dirty="0"/>
               <a:t>Model Selection</a:t>
             </a:r>
           </a:p>
@@ -16728,7 +16728,7 @@
               <a:buChar char="o"/>
             </a:pPr>
             <a:r>
-              <a:rPr lang="en-US" sz="2000"/>
+              <a:rPr lang="en-US" sz="2000" dirty="0"/>
               <a:t>Challenges</a:t>
             </a:r>
           </a:p>
@@ -16738,17 +16738,7 @@
               <a:buChar char="o"/>
             </a:pPr>
             <a:r>
-              <a:rPr lang="en-US" sz="2000"/>
-              <a:t>Data Validation</a:t>
-            </a:r>
-          </a:p>
-          <a:p>
-            <a:pPr>
-              <a:buFont typeface="Courier New" panose="020F0502020204030204" pitchFamily="34" charset="0"/>
-              <a:buChar char="o"/>
-            </a:pPr>
-            <a:r>
-              <a:rPr lang="en-US" sz="2000"/>
+              <a:rPr lang="en-US" sz="2000" dirty="0"/>
               <a:t>Questions</a:t>
             </a:r>
           </a:p>
@@ -16757,10 +16747,10 @@
               <a:buFont typeface="Courier New" panose="020F0502020204030204" pitchFamily="34" charset="0"/>
               <a:buChar char="o"/>
             </a:pPr>
-            <a:endParaRPr lang="en-US" sz="2000"/>
+            <a:endParaRPr lang="en-US" sz="2000" dirty="0"/>
           </a:p>
           <a:p>
-            <a:endParaRPr lang="en-US"/>
+            <a:endParaRPr lang="en-US" dirty="0"/>
           </a:p>
         </p:txBody>
       </p:sp>
@@ -19339,15 +19329,6 @@
 </file>
 
 <file path=customXml/item1.xml><?xml version="1.0" encoding="utf-8"?>
-<?mso-contentType ?>
-<FormTemplates xmlns="http://schemas.microsoft.com/sharepoint/v3/contenttype/forms">
-  <Display>DocumentLibraryForm</Display>
-  <Edit>DocumentLibraryForm</Edit>
-  <New>DocumentLibraryForm</New>
-</FormTemplates>
-</file>
-
-<file path=customXml/item2.xml><?xml version="1.0" encoding="utf-8"?>
 <ct:contentTypeSchema xmlns:ct="http://schemas.microsoft.com/office/2006/metadata/contentType" xmlns:ma="http://schemas.microsoft.com/office/2006/metadata/properties/metaAttributes" ct:_="" ma:_="" ma:contentTypeName="Document" ma:contentTypeID="0x0101009E371F699C7D5D4DAD4314D90974EC8C" ma:contentTypeVersion="8" ma:contentTypeDescription="Create a new document." ma:contentTypeScope="" ma:versionID="13e2363da92696a32a40e3eed9c4375e">
   <xsd:schema xmlns:xsd="http://www.w3.org/2001/XMLSchema" xmlns:xs="http://www.w3.org/2001/XMLSchema" xmlns:p="http://schemas.microsoft.com/office/2006/metadata/properties" xmlns:ns2="eb9434e9-b13e-4cc8-a4e1-cd92508e485b" targetNamespace="http://schemas.microsoft.com/office/2006/metadata/properties" ma:root="true" ma:fieldsID="ac5513f309771d18d439cbfeadfcb1c0" ns2:_="">
     <xsd:import namespace="eb9434e9-b13e-4cc8-a4e1-cd92508e485b"/>
@@ -19519,6 +19500,15 @@
 </ct:contentTypeSchema>
 </file>
 
+<file path=customXml/item2.xml><?xml version="1.0" encoding="utf-8"?>
+<?mso-contentType ?>
+<FormTemplates xmlns="http://schemas.microsoft.com/sharepoint/v3/contenttype/forms">
+  <Display>DocumentLibraryForm</Display>
+  <Edit>DocumentLibraryForm</Edit>
+  <New>DocumentLibraryForm</New>
+</FormTemplates>
+</file>
+
 <file path=customXml/item3.xml><?xml version="1.0" encoding="utf-8"?>
 <p:properties xmlns:p="http://schemas.microsoft.com/office/2006/metadata/properties" xmlns:xsi="http://www.w3.org/2001/XMLSchema-instance" xmlns:pc="http://schemas.microsoft.com/office/infopath/2007/PartnerControls">
   <documentManagement>
@@ -19528,14 +19518,6 @@
 </file>
 
 <file path=customXml/itemProps1.xml><?xml version="1.0" encoding="utf-8"?>
-<ds:datastoreItem xmlns:ds="http://schemas.openxmlformats.org/officeDocument/2006/customXml" ds:itemID="{2E5ECA37-C458-4BA2-A090-D7A19E07B434}">
-  <ds:schemaRefs>
-    <ds:schemaRef ds:uri="http://schemas.microsoft.com/sharepoint/v3/contenttype/forms"/>
-  </ds:schemaRefs>
-</ds:datastoreItem>
-</file>
-
-<file path=customXml/itemProps2.xml><?xml version="1.0" encoding="utf-8"?>
 <ds:datastoreItem xmlns:ds="http://schemas.openxmlformats.org/officeDocument/2006/customXml" ds:itemID="{16C1DB46-7A79-4E15-BD71-B79CDA1B259D}">
   <ds:schemaRefs>
     <ds:schemaRef ds:uri="eb9434e9-b13e-4cc8-a4e1-cd92508e485b"/>
@@ -19549,6 +19531,14 @@
     <ds:schemaRef ds:uri="http://schemas.microsoft.com/office/infopath/2007/PartnerControls"/>
     <ds:schemaRef ds:uri="http://schemas.openxmlformats.org/package/2006/metadata/core-properties"/>
     <ds:schemaRef ds:uri="http://www.w3.org/2001/XMLSchema"/>
+  </ds:schemaRefs>
+</ds:datastoreItem>
+</file>
+
+<file path=customXml/itemProps2.xml><?xml version="1.0" encoding="utf-8"?>
+<ds:datastoreItem xmlns:ds="http://schemas.openxmlformats.org/officeDocument/2006/customXml" ds:itemID="{2E5ECA37-C458-4BA2-A090-D7A19E07B434}">
+  <ds:schemaRefs>
+    <ds:schemaRef ds:uri="http://schemas.microsoft.com/sharepoint/v3/contenttype/forms"/>
   </ds:schemaRefs>
 </ds:datastoreItem>
 </file>

</xml_diff>